<commit_message>
Updated the final presentation material.
</commit_message>
<xml_diff>
--- a/Project 3 - Presentation Material.pptx
+++ b/Project 3 - Presentation Material.pptx
@@ -127,6 +127,89 @@
     <p1510:client id="{5DC7A827-E6FF-4541-95ED-FF0E6BEFFBB3}" v="2" dt="2022-07-15T22:15:09.895"/>
   </p1510:revLst>
 </p1510:revInfo>
+</file>
+
+<file path=ppt/changesInfos/changesInfo1.xml><?xml version="1.0" encoding="utf-8"?>
+<pc:chgInfo xmlns:a="http://schemas.openxmlformats.org/drawingml/2006/main" xmlns:r="http://schemas.openxmlformats.org/officeDocument/2006/relationships" xmlns:ac="http://schemas.microsoft.com/office/drawing/2013/main/command" xmlns:pc="http://schemas.microsoft.com/office/powerpoint/2013/main/command">
+  <pc:docChgLst>
+    <pc:chgData name="Mary Jane Rafol" userId="2b73c172-9783-479a-a85f-31486109688b" providerId="ADAL" clId="{35250CD3-F8CD-4D15-A564-5F4111C87F1A}"/>
+    <pc:docChg chg="undo custSel modSld">
+      <pc:chgData name="Mary Jane Rafol" userId="2b73c172-9783-479a-a85f-31486109688b" providerId="ADAL" clId="{35250CD3-F8CD-4D15-A564-5F4111C87F1A}" dt="2022-07-16T01:47:40.760" v="23" actId="20577"/>
+      <pc:docMkLst>
+        <pc:docMk/>
+      </pc:docMkLst>
+      <pc:sldChg chg="modSp mod">
+        <pc:chgData name="Mary Jane Rafol" userId="2b73c172-9783-479a-a85f-31486109688b" providerId="ADAL" clId="{35250CD3-F8CD-4D15-A564-5F4111C87F1A}" dt="2022-07-16T01:47:40.760" v="23" actId="20577"/>
+        <pc:sldMkLst>
+          <pc:docMk/>
+          <pc:sldMk cId="73783058" sldId="261"/>
+        </pc:sldMkLst>
+        <pc:spChg chg="mod">
+          <ac:chgData name="Mary Jane Rafol" userId="2b73c172-9783-479a-a85f-31486109688b" providerId="ADAL" clId="{35250CD3-F8CD-4D15-A564-5F4111C87F1A}" dt="2022-07-16T01:47:18.207" v="15" actId="20577"/>
+          <ac:spMkLst>
+            <pc:docMk/>
+            <pc:sldMk cId="73783058" sldId="261"/>
+            <ac:spMk id="21" creationId="{ECBA62D1-A02F-EECC-1C08-0DF8D3D70709}"/>
+          </ac:spMkLst>
+        </pc:spChg>
+        <pc:spChg chg="mod">
+          <ac:chgData name="Mary Jane Rafol" userId="2b73c172-9783-479a-a85f-31486109688b" providerId="ADAL" clId="{35250CD3-F8CD-4D15-A564-5F4111C87F1A}" dt="2022-07-16T01:47:40.760" v="23" actId="20577"/>
+          <ac:spMkLst>
+            <pc:docMk/>
+            <pc:sldMk cId="73783058" sldId="261"/>
+            <ac:spMk id="23" creationId="{41D741EA-ADC0-5FA5-5D25-82B871236E4D}"/>
+          </ac:spMkLst>
+        </pc:spChg>
+      </pc:sldChg>
+      <pc:sldChg chg="addSp delSp modSp mod">
+        <pc:chgData name="Mary Jane Rafol" userId="2b73c172-9783-479a-a85f-31486109688b" providerId="ADAL" clId="{35250CD3-F8CD-4D15-A564-5F4111C87F1A}" dt="2022-07-16T01:26:18.014" v="3" actId="1076"/>
+        <pc:sldMkLst>
+          <pc:docMk/>
+          <pc:sldMk cId="3016252476" sldId="266"/>
+        </pc:sldMkLst>
+        <pc:picChg chg="del">
+          <ac:chgData name="Mary Jane Rafol" userId="2b73c172-9783-479a-a85f-31486109688b" providerId="ADAL" clId="{35250CD3-F8CD-4D15-A564-5F4111C87F1A}" dt="2022-07-16T01:26:12.299" v="0" actId="478"/>
+          <ac:picMkLst>
+            <pc:docMk/>
+            <pc:sldMk cId="3016252476" sldId="266"/>
+            <ac:picMk id="3" creationId="{8009BD2D-EFDB-B5E7-8C19-03E29AD9809C}"/>
+          </ac:picMkLst>
+        </pc:picChg>
+        <pc:picChg chg="add mod">
+          <ac:chgData name="Mary Jane Rafol" userId="2b73c172-9783-479a-a85f-31486109688b" providerId="ADAL" clId="{35250CD3-F8CD-4D15-A564-5F4111C87F1A}" dt="2022-07-16T01:26:18.014" v="3" actId="1076"/>
+          <ac:picMkLst>
+            <pc:docMk/>
+            <pc:sldMk cId="3016252476" sldId="266"/>
+            <ac:picMk id="4" creationId="{E98CAC39-FC9B-84E4-4D5D-BD77B1A20D9E}"/>
+          </ac:picMkLst>
+        </pc:picChg>
+      </pc:sldChg>
+      <pc:sldChg chg="addSp delSp modSp mod">
+        <pc:chgData name="Mary Jane Rafol" userId="2b73c172-9783-479a-a85f-31486109688b" providerId="ADAL" clId="{35250CD3-F8CD-4D15-A564-5F4111C87F1A}" dt="2022-07-16T01:28:10.351" v="9" actId="1076"/>
+        <pc:sldMkLst>
+          <pc:docMk/>
+          <pc:sldMk cId="3267392007" sldId="268"/>
+        </pc:sldMkLst>
+        <pc:picChg chg="del">
+          <ac:chgData name="Mary Jane Rafol" userId="2b73c172-9783-479a-a85f-31486109688b" providerId="ADAL" clId="{35250CD3-F8CD-4D15-A564-5F4111C87F1A}" dt="2022-07-16T01:28:01.083" v="4" actId="478"/>
+          <ac:picMkLst>
+            <pc:docMk/>
+            <pc:sldMk cId="3267392007" sldId="268"/>
+            <ac:picMk id="3" creationId="{461858C9-F5D2-A437-10C8-FB2F693EFFEF}"/>
+          </ac:picMkLst>
+        </pc:picChg>
+        <pc:picChg chg="add mod">
+          <ac:chgData name="Mary Jane Rafol" userId="2b73c172-9783-479a-a85f-31486109688b" providerId="ADAL" clId="{35250CD3-F8CD-4D15-A564-5F4111C87F1A}" dt="2022-07-16T01:28:10.351" v="9" actId="1076"/>
+          <ac:picMkLst>
+            <pc:docMk/>
+            <pc:sldMk cId="3267392007" sldId="268"/>
+            <ac:picMk id="4" creationId="{AC0AAF21-88F8-69E4-67E6-9FB789CE6E29}"/>
+          </ac:picMkLst>
+        </pc:picChg>
+      </pc:sldChg>
+    </pc:docChg>
+  </pc:docChgLst>
+</pc:chgInfo>
 </file>
 
 <file path=ppt/notesMasters/notesMaster1.xml><?xml version="1.0" encoding="utf-8"?>
@@ -7356,7 +7439,7 @@
                 <a:cs typeface="Calibri"/>
                 <a:sym typeface="Calibri"/>
               </a:rPr>
-              <a:t>Demographic Info / Race Distribution by County:</a:t>
+              <a:t>Demographic Info / Origin Distribution by County:</a:t>
             </a:r>
           </a:p>
           <a:p>
@@ -8854,36 +8937,6 @@
           </a:p>
         </p:txBody>
       </p:sp>
-      <p:pic>
-        <p:nvPicPr>
-          <p:cNvPr id="3" name="Picture 2">
-            <a:extLst>
-              <a:ext uri="{FF2B5EF4-FFF2-40B4-BE49-F238E27FC236}">
-                <a16:creationId xmlns:a16="http://schemas.microsoft.com/office/drawing/2014/main" id="{8009BD2D-EFDB-B5E7-8C19-03E29AD9809C}"/>
-              </a:ext>
-            </a:extLst>
-          </p:cNvPr>
-          <p:cNvPicPr>
-            <a:picLocks noChangeAspect="1"/>
-          </p:cNvPicPr>
-          <p:nvPr/>
-        </p:nvPicPr>
-        <p:blipFill>
-          <a:blip r:embed="rId3"/>
-          <a:stretch>
-            <a:fillRect/>
-          </a:stretch>
-        </p:blipFill>
-        <p:spPr>
-          <a:xfrm>
-            <a:off x="582364" y="1954382"/>
-            <a:ext cx="3933795" cy="4322260"/>
-          </a:xfrm>
-          <a:prstGeom prst="rect">
-            <a:avLst/>
-          </a:prstGeom>
-        </p:spPr>
-      </p:pic>
       <p:grpSp>
         <p:nvGrpSpPr>
           <p:cNvPr id="16" name="Google Shape;249;p41">
@@ -9078,6 +9131,36 @@
           <p:nvPr/>
         </p:nvPicPr>
         <p:blipFill>
+          <a:blip r:embed="rId3"/>
+          <a:stretch>
+            <a:fillRect/>
+          </a:stretch>
+        </p:blipFill>
+        <p:spPr>
+          <a:xfrm>
+            <a:off x="5521301" y="2062721"/>
+            <a:ext cx="5916687" cy="4124591"/>
+          </a:xfrm>
+          <a:prstGeom prst="rect">
+            <a:avLst/>
+          </a:prstGeom>
+        </p:spPr>
+      </p:pic>
+      <p:pic>
+        <p:nvPicPr>
+          <p:cNvPr id="4" name="Picture 3">
+            <a:extLst>
+              <a:ext uri="{FF2B5EF4-FFF2-40B4-BE49-F238E27FC236}">
+                <a16:creationId xmlns:a16="http://schemas.microsoft.com/office/drawing/2014/main" id="{E98CAC39-FC9B-84E4-4D5D-BD77B1A20D9E}"/>
+              </a:ext>
+            </a:extLst>
+          </p:cNvPr>
+          <p:cNvPicPr>
+            <a:picLocks noChangeAspect="1"/>
+          </p:cNvPicPr>
+          <p:nvPr/>
+        </p:nvPicPr>
+        <p:blipFill>
           <a:blip r:embed="rId4"/>
           <a:stretch>
             <a:fillRect/>
@@ -9085,8 +9168,8 @@
         </p:blipFill>
         <p:spPr>
           <a:xfrm>
-            <a:off x="5521301" y="2062721"/>
-            <a:ext cx="5916687" cy="4124591"/>
+            <a:off x="582364" y="1950943"/>
+            <a:ext cx="3796871" cy="4236369"/>
           </a:xfrm>
           <a:prstGeom prst="rect">
             <a:avLst/>
@@ -9603,10 +9686,10 @@
       </p:sp>
       <p:pic>
         <p:nvPicPr>
-          <p:cNvPr id="3" name="Picture 2">
-            <a:extLst>
-              <a:ext uri="{FF2B5EF4-FFF2-40B4-BE49-F238E27FC236}">
-                <a16:creationId xmlns:a16="http://schemas.microsoft.com/office/drawing/2014/main" id="{461858C9-F5D2-A437-10C8-FB2F693EFFEF}"/>
+          <p:cNvPr id="4" name="Picture 3">
+            <a:extLst>
+              <a:ext uri="{FF2B5EF4-FFF2-40B4-BE49-F238E27FC236}">
+                <a16:creationId xmlns:a16="http://schemas.microsoft.com/office/drawing/2014/main" id="{AC0AAF21-88F8-69E4-67E6-9FB789CE6E29}"/>
               </a:ext>
             </a:extLst>
           </p:cNvPr>
@@ -9623,8 +9706,8 @@
         </p:blipFill>
         <p:spPr>
           <a:xfrm>
-            <a:off x="512445" y="2096445"/>
-            <a:ext cx="6789507" cy="3904566"/>
+            <a:off x="582364" y="2047444"/>
+            <a:ext cx="7130705" cy="4145332"/>
           </a:xfrm>
           <a:prstGeom prst="rect">
             <a:avLst/>

</xml_diff>